<commit_message>
se añaden códigos del día miércoles, temas posicionamiento y modelo de cajas
</commit_message>
<xml_diff>
--- a/Básico/html-EtiquetasBásicas.pptx
+++ b/Básico/html-EtiquetasBásicas.pptx
@@ -6,11 +6,12 @@
   </p:sldMasterIdLst>
   <p:sldIdLst>
     <p:sldId id="256" r:id="rId3"/>
-    <p:sldId id="281" r:id="rId4"/>
-    <p:sldId id="280" r:id="rId5"/>
-    <p:sldId id="282" r:id="rId6"/>
-    <p:sldId id="283" r:id="rId7"/>
-    <p:sldId id="284" r:id="rId8"/>
+    <p:sldId id="286" r:id="rId4"/>
+    <p:sldId id="281" r:id="rId5"/>
+    <p:sldId id="280" r:id="rId6"/>
+    <p:sldId id="282" r:id="rId7"/>
+    <p:sldId id="283" r:id="rId8"/>
+    <p:sldId id="284" r:id="rId9"/>
   </p:sldIdLst>
   <p:sldSz cx="9144000" cy="6858000" type="screen4x3"/>
   <p:notesSz cx="6858000" cy="9144000"/>
@@ -1868,7 +1869,7 @@
               <a:rPr lang="x-none" altLang="es-MX" dirty="0">
                 <a:latin typeface="Comic Sans MS" charset="0"/>
               </a:rPr>
-              <a:t>HTML 5</a:t>
+              <a:t>HTML </a:t>
             </a:r>
             <a:endParaRPr lang="x-none" altLang="es-MX" dirty="0">
               <a:latin typeface="Comic Sans MS" charset="0"/>
@@ -2114,6 +2115,129 @@
 </file>
 
 <file path=ppt/slides/slide2.xml><?xml version="1.0" encoding="utf-8"?>
+<p:sld xmlns:a="http://schemas.openxmlformats.org/drawingml/2006/main" xmlns:r="http://schemas.openxmlformats.org/officeDocument/2006/relationships" xmlns:p="http://schemas.openxmlformats.org/presentationml/2006/main">
+  <p:cSld>
+    <p:spTree>
+      <p:nvGrpSpPr>
+        <p:cNvPr id="1" name=""/>
+        <p:cNvGrpSpPr/>
+        <p:nvPr/>
+      </p:nvGrpSpPr>
+      <p:grpSpPr/>
+      <p:sp>
+        <p:nvSpPr>
+          <p:cNvPr id="2" name="Título 1"/>
+          <p:cNvSpPr>
+            <a:spLocks noGrp="1"/>
+          </p:cNvSpPr>
+          <p:nvPr>
+            <p:ph type="title"/>
+          </p:nvPr>
+        </p:nvSpPr>
+        <p:spPr/>
+        <p:txBody>
+          <a:bodyPr/>
+          <a:p>
+            <a:r>
+              <a:rPr lang="x-none" altLang="es-ES"/>
+              <a:t>¿Qué es HTML?</a:t>
+            </a:r>
+            <a:endParaRPr lang="x-none" altLang="es-ES"/>
+          </a:p>
+        </p:txBody>
+      </p:sp>
+      <p:sp>
+        <p:nvSpPr>
+          <p:cNvPr id="3" name="Content Placeholder 2"/>
+          <p:cNvSpPr>
+            <a:spLocks noGrp="1"/>
+          </p:cNvSpPr>
+          <p:nvPr>
+            <p:ph idx="1"/>
+          </p:nvPr>
+        </p:nvSpPr>
+        <p:spPr>
+          <a:xfrm>
+            <a:off x="1646555" y="1787525"/>
+            <a:ext cx="3861435" cy="4445635"/>
+          </a:xfrm>
+        </p:spPr>
+        <p:txBody>
+          <a:bodyPr/>
+          <a:p>
+            <a:pPr algn="just"/>
+            <a:r>
+              <a:rPr lang="es-ES" altLang="en-US"/>
+              <a:t>Hyper Text Markup Language</a:t>
+            </a:r>
+            <a:r>
+              <a:rPr lang="x-none" altLang="es-ES"/>
+              <a:t>:</a:t>
+            </a:r>
+            <a:endParaRPr lang="x-none" altLang="es-ES"/>
+          </a:p>
+          <a:p>
+            <a:pPr algn="just"/>
+            <a:endParaRPr lang="x-none" altLang="es-ES"/>
+          </a:p>
+          <a:p>
+            <a:pPr algn="just"/>
+            <a:r>
+              <a:rPr lang="x-none" altLang="es-ES"/>
+              <a:t>Es el lenguaje de marcado estándar para la creación de páginas Web.</a:t>
+            </a:r>
+            <a:endParaRPr lang="x-none" altLang="es-ES"/>
+          </a:p>
+          <a:p>
+            <a:pPr algn="just"/>
+            <a:endParaRPr lang="x-none" altLang="es-ES"/>
+          </a:p>
+          <a:p>
+            <a:pPr algn="just"/>
+            <a:r>
+              <a:rPr lang="x-none" altLang="es-ES"/>
+              <a:t>Un navegador no muestra las etiquetas, pero sí las interpreta para darle estructura y representar el contenido de una página web.</a:t>
+            </a:r>
+            <a:endParaRPr lang="x-none" altLang="es-ES"/>
+          </a:p>
+        </p:txBody>
+      </p:sp>
+      <p:pic>
+        <p:nvPicPr>
+          <p:cNvPr id="4" name="Imagen 3"/>
+          <p:cNvPicPr>
+            <a:picLocks noChangeAspect="1"/>
+          </p:cNvPicPr>
+          <p:nvPr/>
+        </p:nvPicPr>
+        <p:blipFill>
+          <a:blip r:embed="rId1"/>
+          <a:stretch>
+            <a:fillRect/>
+          </a:stretch>
+        </p:blipFill>
+        <p:spPr>
+          <a:xfrm>
+            <a:off x="5849620" y="2026285"/>
+            <a:ext cx="2564765" cy="2564765"/>
+          </a:xfrm>
+          <a:prstGeom prst="rect">
+            <a:avLst/>
+          </a:prstGeom>
+        </p:spPr>
+      </p:pic>
+    </p:spTree>
+  </p:cSld>
+  <p:clrMapOvr>
+    <a:masterClrMapping/>
+  </p:clrMapOvr>
+  <p:transition>
+    <p:fade/>
+  </p:transition>
+</p:sld>
+</file>
+
+<file path=ppt/slides/slide3.xml><?xml version="1.0" encoding="utf-8"?>
 <p:sld xmlns:a="http://schemas.openxmlformats.org/drawingml/2006/main" xmlns:r="http://schemas.openxmlformats.org/officeDocument/2006/relationships" xmlns:p="http://schemas.openxmlformats.org/presentationml/2006/main">
   <p:cSld>
     <p:spTree>
@@ -2523,7 +2647,7 @@
 </p:sld>
 </file>
 
-<file path=ppt/slides/slide3.xml><?xml version="1.0" encoding="utf-8"?>
+<file path=ppt/slides/slide4.xml><?xml version="1.0" encoding="utf-8"?>
 <p:sld xmlns:a="http://schemas.openxmlformats.org/drawingml/2006/main" xmlns:r="http://schemas.openxmlformats.org/officeDocument/2006/relationships" xmlns:p="http://schemas.openxmlformats.org/presentationml/2006/main">
   <p:cSld>
     <p:spTree>
@@ -2598,7 +2722,7 @@
 </p:sld>
 </file>
 
-<file path=ppt/slides/slide4.xml><?xml version="1.0" encoding="utf-8"?>
+<file path=ppt/slides/slide5.xml><?xml version="1.0" encoding="utf-8"?>
 <p:sld xmlns:a="http://schemas.openxmlformats.org/drawingml/2006/main" xmlns:r="http://schemas.openxmlformats.org/officeDocument/2006/relationships" xmlns:p="http://schemas.openxmlformats.org/presentationml/2006/main">
   <p:cSld>
     <p:spTree>
@@ -3731,7 +3855,7 @@
 </p:sld>
 </file>
 
-<file path=ppt/slides/slide5.xml><?xml version="1.0" encoding="utf-8"?>
+<file path=ppt/slides/slide6.xml><?xml version="1.0" encoding="utf-8"?>
 <p:sld xmlns:a="http://schemas.openxmlformats.org/drawingml/2006/main" xmlns:r="http://schemas.openxmlformats.org/officeDocument/2006/relationships" xmlns:p="http://schemas.openxmlformats.org/presentationml/2006/main">
   <p:cSld>
     <p:spTree>
@@ -3800,7 +3924,7 @@
 </p:sld>
 </file>
 
-<file path=ppt/slides/slide6.xml><?xml version="1.0" encoding="utf-8"?>
+<file path=ppt/slides/slide7.xml><?xml version="1.0" encoding="utf-8"?>
 <p:sld xmlns:a="http://schemas.openxmlformats.org/drawingml/2006/main" xmlns:r="http://schemas.openxmlformats.org/officeDocument/2006/relationships" xmlns:p="http://schemas.openxmlformats.org/presentationml/2006/main">
   <p:cSld>
     <p:spTree>
@@ -3875,7 +3999,6 @@
             <a:pPr algn="ctr"/>
             <a:r>
               <a:rPr lang="x-none" altLang="es-ES" sz="3600">
-                <a:ln/>
                 <a:solidFill>
                   <a:schemeClr val="accent1"/>
                 </a:solidFill>
@@ -3890,7 +4013,6 @@
               <a:t>&lt;ejemplo&gt;</a:t>
             </a:r>
             <a:endParaRPr lang="x-none" altLang="es-ES" sz="3600">
-              <a:ln/>
               <a:solidFill>
                 <a:schemeClr val="accent1"/>
               </a:solidFill>

</xml_diff>